<commit_message>
Documentation and Presentation update
MT
</commit_message>
<xml_diff>
--- a/Presentation.pptx
+++ b/Presentation.pptx
@@ -5,16 +5,14 @@
     <p:sldMasterId id="2147483648" r:id="rId1"/>
   </p:sldMasterIdLst>
   <p:notesMasterIdLst>
-    <p:notesMasterId r:id="rId9"/>
+    <p:notesMasterId r:id="rId7"/>
   </p:notesMasterIdLst>
   <p:sldIdLst>
     <p:sldId id="256" r:id="rId2"/>
     <p:sldId id="259" r:id="rId3"/>
     <p:sldId id="267" r:id="rId4"/>
     <p:sldId id="270" r:id="rId5"/>
-    <p:sldId id="268" r:id="rId6"/>
-    <p:sldId id="269" r:id="rId7"/>
-    <p:sldId id="271" r:id="rId8"/>
+    <p:sldId id="269" r:id="rId6"/>
   </p:sldIdLst>
   <p:sldSz cx="12192000" cy="6858000"/>
   <p:notesSz cx="6858000" cy="9144000"/>
@@ -131,20 +129,6 @@
     </p:extLst>
   </p:cmAuthor>
 </p:cmAuthorLst>
-</file>
-
-<file path=ppt/comments/comment1.xml><?xml version="1.0" encoding="utf-8"?>
-<p:cmLst xmlns:a="http://schemas.openxmlformats.org/drawingml/2006/main" xmlns:r="http://schemas.openxmlformats.org/officeDocument/2006/relationships" xmlns:p="http://schemas.openxmlformats.org/presentationml/2006/main">
-  <p:cm authorId="1" dt="2016-02-20T08:48:30.398" idx="1">
-    <p:pos x="10" y="10"/>
-    <p:text>Bullets 1 &amp; 2: Monica, Bullet 3:</p:text>
-    <p:extLst>
-      <p:ext uri="{C676402C-5697-4E1C-873F-D02D1690AC5C}">
-        <p15:threadingInfo xmlns:p15="http://schemas.microsoft.com/office/powerpoint/2012/main" timeZoneBias="360"/>
-      </p:ext>
-    </p:extLst>
-  </p:cm>
-</p:cmLst>
 </file>
 
 <file path=ppt/diagrams/colors1.xml><?xml version="1.0" encoding="utf-8"?>
@@ -1065,14 +1049,35 @@
         </dgm:presLayoutVars>
       </dgm:prSet>
       <dgm:spPr/>
+      <dgm:t>
+        <a:bodyPr/>
+        <a:lstStyle/>
+        <a:p>
+          <a:endParaRPr lang="en-US"/>
+        </a:p>
+      </dgm:t>
     </dgm:pt>
     <dgm:pt modelId="{85191E87-D398-4DED-ACEC-0811F1D794C4}" type="pres">
       <dgm:prSet presAssocID="{15081D0D-E057-44A8-B2C7-63844E986244}" presName="sibTrans" presStyleLbl="sibTrans2D1" presStyleIdx="0" presStyleCnt="3"/>
       <dgm:spPr/>
+      <dgm:t>
+        <a:bodyPr/>
+        <a:lstStyle/>
+        <a:p>
+          <a:endParaRPr lang="en-US"/>
+        </a:p>
+      </dgm:t>
     </dgm:pt>
     <dgm:pt modelId="{D7F283BD-5841-44A0-864E-A96E411ACF5C}" type="pres">
       <dgm:prSet presAssocID="{15081D0D-E057-44A8-B2C7-63844E986244}" presName="connectorText" presStyleLbl="sibTrans2D1" presStyleIdx="0" presStyleCnt="3"/>
       <dgm:spPr/>
+      <dgm:t>
+        <a:bodyPr/>
+        <a:lstStyle/>
+        <a:p>
+          <a:endParaRPr lang="en-US"/>
+        </a:p>
+      </dgm:t>
     </dgm:pt>
     <dgm:pt modelId="{BB629AAC-D893-4910-857D-1FA566DB945F}" type="pres">
       <dgm:prSet presAssocID="{1213A0DE-DE3A-4E0F-87C0-1EB121339101}" presName="node" presStyleLbl="node1" presStyleIdx="1" presStyleCnt="4">
@@ -1092,10 +1097,24 @@
     <dgm:pt modelId="{C4F4F214-A66D-4A57-9C00-2BFBEC286572}" type="pres">
       <dgm:prSet presAssocID="{61C6B059-5604-427E-98B8-D16708F7BD8E}" presName="sibTrans" presStyleLbl="sibTrans2D1" presStyleIdx="1" presStyleCnt="3"/>
       <dgm:spPr/>
+      <dgm:t>
+        <a:bodyPr/>
+        <a:lstStyle/>
+        <a:p>
+          <a:endParaRPr lang="en-US"/>
+        </a:p>
+      </dgm:t>
     </dgm:pt>
     <dgm:pt modelId="{B121EEBF-170E-48D0-A5E9-6D92F411BB52}" type="pres">
       <dgm:prSet presAssocID="{61C6B059-5604-427E-98B8-D16708F7BD8E}" presName="connectorText" presStyleLbl="sibTrans2D1" presStyleIdx="1" presStyleCnt="3"/>
       <dgm:spPr/>
+      <dgm:t>
+        <a:bodyPr/>
+        <a:lstStyle/>
+        <a:p>
+          <a:endParaRPr lang="en-US"/>
+        </a:p>
+      </dgm:t>
     </dgm:pt>
     <dgm:pt modelId="{E932B47C-E8B4-423C-A9B6-DBD0A79178DF}" type="pres">
       <dgm:prSet presAssocID="{BC332C79-6C47-4668-91F1-F8AF6C963A7D}" presName="node" presStyleLbl="node1" presStyleIdx="2" presStyleCnt="4">
@@ -1115,10 +1134,24 @@
     <dgm:pt modelId="{5F7C5BC5-355B-4FA7-BC77-46AE2BF1FA6C}" type="pres">
       <dgm:prSet presAssocID="{77860D55-A87F-47B1-9756-2E604DA5C596}" presName="sibTrans" presStyleLbl="sibTrans2D1" presStyleIdx="2" presStyleCnt="3"/>
       <dgm:spPr/>
+      <dgm:t>
+        <a:bodyPr/>
+        <a:lstStyle/>
+        <a:p>
+          <a:endParaRPr lang="en-US"/>
+        </a:p>
+      </dgm:t>
     </dgm:pt>
     <dgm:pt modelId="{B2CC9CAB-AC4A-459E-B162-3F6608A1F488}" type="pres">
       <dgm:prSet presAssocID="{77860D55-A87F-47B1-9756-2E604DA5C596}" presName="connectorText" presStyleLbl="sibTrans2D1" presStyleIdx="2" presStyleCnt="3"/>
       <dgm:spPr/>
+      <dgm:t>
+        <a:bodyPr/>
+        <a:lstStyle/>
+        <a:p>
+          <a:endParaRPr lang="en-US"/>
+        </a:p>
+      </dgm:t>
     </dgm:pt>
     <dgm:pt modelId="{99E94813-72A5-4B6C-B1D7-092AC96C0932}" type="pres">
       <dgm:prSet presAssocID="{2F87AB4F-E645-49A1-AD0F-9C65032DB0BD}" presName="node" presStyleLbl="node1" presStyleIdx="3" presStyleCnt="4">
@@ -3391,7 +3424,7 @@
           <a:p>
             <a:fld id="{1B857648-3486-4D0A-B75E-794986C9FD60}" type="slidenum">
               <a:rPr lang="en-US" smtClean="0"/>
-              <a:t>6</a:t>
+              <a:t>5</a:t>
             </a:fld>
             <a:endParaRPr lang="en-US"/>
           </a:p>
@@ -6856,8 +6889,8 @@
         </p:nvSpPr>
         <p:spPr>
           <a:xfrm>
-            <a:off x="425116" y="1636295"/>
-            <a:ext cx="10328228" cy="4832092"/>
+            <a:off x="171116" y="1382295"/>
+            <a:ext cx="10328228" cy="5570756"/>
           </a:xfrm>
           <a:prstGeom prst="rect">
             <a:avLst/>
@@ -6875,7 +6908,7 @@
               <a:buChar char="•"/>
             </a:pPr>
             <a:r>
-              <a:rPr lang="en-US" sz="3200" dirty="0" smtClean="0">
+              <a:rPr lang="en-US" sz="2800" dirty="0" smtClean="0">
                 <a:solidFill>
                   <a:schemeClr val="tx1">
                     <a:lumMod val="65000"/>
@@ -6887,48 +6920,6 @@
               <a:t>We created an application that virtualizes FLIP Kits from the Children’s Museum of </a:t>
             </a:r>
             <a:r>
-              <a:rPr lang="en-US" sz="3200" dirty="0" smtClean="0">
-                <a:solidFill>
-                  <a:schemeClr val="tx1">
-                    <a:lumMod val="65000"/>
-                    <a:lumOff val="35000"/>
-                  </a:schemeClr>
-                </a:solidFill>
-                <a:cs typeface="Arial" panose="020B0604020202020204" pitchFamily="34" charset="0"/>
-              </a:rPr>
-              <a:t>Houston</a:t>
-            </a:r>
-            <a:endParaRPr lang="en-US" sz="3200" dirty="0">
-              <a:solidFill>
-                <a:schemeClr val="tx1">
-                  <a:lumMod val="65000"/>
-                  <a:lumOff val="35000"/>
-                </a:schemeClr>
-              </a:solidFill>
-              <a:cs typeface="Arial" panose="020B0604020202020204" pitchFamily="34" charset="0"/>
-            </a:endParaRPr>
-          </a:p>
-          <a:p>
-            <a:pPr marL="285750" indent="-285750">
-              <a:buFont typeface="Arial" panose="020B0604020202020204" pitchFamily="34" charset="0"/>
-              <a:buChar char="•"/>
-            </a:pPr>
-            <a:r>
-              <a:rPr lang="en-US" sz="3200" dirty="0" smtClean="0">
-                <a:solidFill>
-                  <a:schemeClr val="tx1">
-                    <a:lumMod val="65000"/>
-                    <a:lumOff val="35000"/>
-                  </a:schemeClr>
-                </a:solidFill>
-                <a:cs typeface="Arial" panose="020B0604020202020204" pitchFamily="34" charset="0"/>
-              </a:rPr>
-              <a:t>Technologies we used</a:t>
-            </a:r>
-          </a:p>
-          <a:p>
-            <a:pPr lvl="1"/>
-            <a:r>
               <a:rPr lang="en-US" sz="2800" dirty="0" smtClean="0">
                 <a:solidFill>
                   <a:schemeClr val="tx1">
@@ -6938,7 +6929,124 @@
                 </a:solidFill>
                 <a:cs typeface="Arial" panose="020B0604020202020204" pitchFamily="34" charset="0"/>
               </a:rPr>
-              <a:t>- Ionic Framework, ASP.NET, MySQL,</a:t>
+              <a:t>Housto</a:t>
+            </a:r>
+            <a:r>
+              <a:rPr lang="en-US" sz="2800" dirty="0" smtClean="0">
+                <a:solidFill>
+                  <a:schemeClr val="tx1">
+                    <a:lumMod val="65000"/>
+                    <a:lumOff val="35000"/>
+                  </a:schemeClr>
+                </a:solidFill>
+                <a:cs typeface="Arial" panose="020B0604020202020204" pitchFamily="34" charset="0"/>
+              </a:rPr>
+              <a:t>n</a:t>
+            </a:r>
+          </a:p>
+          <a:p>
+            <a:pPr marL="285750" indent="-285750">
+              <a:buFont typeface="Arial" panose="020B0604020202020204" pitchFamily="34" charset="0"/>
+              <a:buChar char="•"/>
+            </a:pPr>
+            <a:endParaRPr lang="en-US" sz="2800" dirty="0">
+              <a:solidFill>
+                <a:schemeClr val="tx1">
+                  <a:lumMod val="65000"/>
+                  <a:lumOff val="35000"/>
+                </a:schemeClr>
+              </a:solidFill>
+              <a:cs typeface="Arial" panose="020B0604020202020204" pitchFamily="34" charset="0"/>
+            </a:endParaRPr>
+          </a:p>
+          <a:p>
+            <a:pPr marL="285750" indent="-285750">
+              <a:buFont typeface="Arial" panose="020B0604020202020204" pitchFamily="34" charset="0"/>
+              <a:buChar char="•"/>
+            </a:pPr>
+            <a:r>
+              <a:rPr lang="en-US" sz="2800" dirty="0" smtClean="0">
+                <a:solidFill>
+                  <a:schemeClr val="tx1">
+                    <a:lumMod val="65000"/>
+                    <a:lumOff val="35000"/>
+                  </a:schemeClr>
+                </a:solidFill>
+                <a:cs typeface="Arial" panose="020B0604020202020204" pitchFamily="34" charset="0"/>
+              </a:rPr>
+              <a:t>Requirements</a:t>
+            </a:r>
+          </a:p>
+          <a:p>
+            <a:pPr marL="914400" lvl="1" indent="-457200">
+              <a:buFontTx/>
+              <a:buChar char="-"/>
+            </a:pPr>
+            <a:r>
+              <a:rPr lang="en-US" sz="2800" b="1" dirty="0" smtClean="0">
+                <a:solidFill>
+                  <a:schemeClr val="tx1">
+                    <a:lumMod val="65000"/>
+                    <a:lumOff val="35000"/>
+                  </a:schemeClr>
+                </a:solidFill>
+                <a:cs typeface="Arial" panose="020B0604020202020204" pitchFamily="34" charset="0"/>
+              </a:rPr>
+              <a:t>User Accounts, Categories Selection,</a:t>
+            </a:r>
+          </a:p>
+          <a:p>
+            <a:pPr lvl="1"/>
+            <a:r>
+              <a:rPr lang="en-US" sz="2800" b="1" dirty="0" smtClean="0">
+                <a:solidFill>
+                  <a:schemeClr val="tx1">
+                    <a:lumMod val="65000"/>
+                    <a:lumOff val="35000"/>
+                  </a:schemeClr>
+                </a:solidFill>
+                <a:cs typeface="Arial" panose="020B0604020202020204" pitchFamily="34" charset="0"/>
+              </a:rPr>
+              <a:t>	Virtualization of Kit Activities, </a:t>
+            </a:r>
+          </a:p>
+          <a:p>
+            <a:pPr lvl="1"/>
+            <a:r>
+              <a:rPr lang="en-US" sz="2800" b="1" dirty="0">
+                <a:solidFill>
+                  <a:schemeClr val="tx1">
+                    <a:lumMod val="65000"/>
+                    <a:lumOff val="35000"/>
+                  </a:schemeClr>
+                </a:solidFill>
+                <a:cs typeface="Arial" panose="020B0604020202020204" pitchFamily="34" charset="0"/>
+              </a:rPr>
+              <a:t>	</a:t>
+            </a:r>
+            <a:r>
+              <a:rPr lang="en-US" sz="2800" b="1" dirty="0" smtClean="0">
+                <a:solidFill>
+                  <a:schemeClr val="tx1">
+                    <a:lumMod val="65000"/>
+                    <a:lumOff val="35000"/>
+                  </a:schemeClr>
+                </a:solidFill>
+                <a:cs typeface="Arial" panose="020B0604020202020204" pitchFamily="34" charset="0"/>
+              </a:rPr>
+              <a:t>Data Collection</a:t>
+            </a:r>
+            <a:r>
+              <a:rPr lang="en-US" sz="2800" dirty="0" smtClean="0">
+                <a:solidFill>
+                  <a:schemeClr val="tx1">
+                    <a:lumMod val="65000"/>
+                    <a:lumOff val="35000"/>
+                  </a:schemeClr>
+                </a:solidFill>
+                <a:cs typeface="Arial" panose="020B0604020202020204" pitchFamily="34" charset="0"/>
+              </a:rPr>
+              <a:t>, Recommendations, </a:t>
             </a:r>
           </a:p>
           <a:p>
@@ -6953,7 +7061,7 @@
                 </a:solidFill>
                 <a:cs typeface="Arial" panose="020B0604020202020204" pitchFamily="34" charset="0"/>
               </a:rPr>
-              <a:t> </a:t>
+              <a:t>	</a:t>
             </a:r>
             <a:r>
               <a:rPr lang="en-US" sz="2800" dirty="0" smtClean="0">
@@ -6965,11 +7073,68 @@
                 </a:solidFill>
                 <a:cs typeface="Arial" panose="020B0604020202020204" pitchFamily="34" charset="0"/>
               </a:rPr>
-              <a:t> Node.js, HTML</a:t>
+              <a:t>Social Media Sharing, E-Book </a:t>
             </a:r>
           </a:p>
           <a:p>
             <a:pPr lvl="1"/>
+            <a:r>
+              <a:rPr lang="en-US" sz="2800" dirty="0">
+                <a:solidFill>
+                  <a:schemeClr val="tx1">
+                    <a:lumMod val="65000"/>
+                    <a:lumOff val="35000"/>
+                  </a:schemeClr>
+                </a:solidFill>
+                <a:cs typeface="Arial" panose="020B0604020202020204" pitchFamily="34" charset="0"/>
+              </a:rPr>
+              <a:t>	</a:t>
+            </a:r>
+            <a:r>
+              <a:rPr lang="en-US" sz="2800" dirty="0" smtClean="0">
+                <a:solidFill>
+                  <a:schemeClr val="tx1">
+                    <a:lumMod val="65000"/>
+                    <a:lumOff val="35000"/>
+                  </a:schemeClr>
+                </a:solidFill>
+                <a:cs typeface="Arial" panose="020B0604020202020204" pitchFamily="34" charset="0"/>
+              </a:rPr>
+              <a:t>Functionality</a:t>
+            </a:r>
+          </a:p>
+          <a:p>
+            <a:pPr marL="285750" indent="-285750">
+              <a:buFont typeface="Arial" panose="020B0604020202020204" pitchFamily="34" charset="0"/>
+              <a:buChar char="•"/>
+            </a:pPr>
+            <a:endParaRPr lang="en-US" sz="2800" dirty="0">
+              <a:solidFill>
+                <a:schemeClr val="tx1">
+                  <a:lumMod val="65000"/>
+                  <a:lumOff val="35000"/>
+                </a:schemeClr>
+              </a:solidFill>
+              <a:cs typeface="Arial" panose="020B0604020202020204" pitchFamily="34" charset="0"/>
+            </a:endParaRPr>
+          </a:p>
+          <a:p>
+            <a:pPr marL="285750" indent="-285750">
+              <a:buFont typeface="Arial" panose="020B0604020202020204" pitchFamily="34" charset="0"/>
+              <a:buChar char="•"/>
+            </a:pPr>
+            <a:r>
+              <a:rPr lang="en-US" sz="2800" dirty="0" smtClean="0">
+                <a:solidFill>
+                  <a:schemeClr val="tx1">
+                    <a:lumMod val="65000"/>
+                    <a:lumOff val="35000"/>
+                  </a:schemeClr>
+                </a:solidFill>
+                <a:cs typeface="Arial" panose="020B0604020202020204" pitchFamily="34" charset="0"/>
+              </a:rPr>
+              <a:t>Technologies utilized</a:t>
+            </a:r>
             <a:endParaRPr lang="en-US" sz="2800" dirty="0" smtClean="0">
               <a:solidFill>
                 <a:schemeClr val="tx1">
@@ -6981,12 +7146,9 @@
             </a:endParaRPr>
           </a:p>
           <a:p>
-            <a:pPr marL="285750" indent="-285750">
-              <a:buFont typeface="Arial" panose="020B0604020202020204" pitchFamily="34" charset="0"/>
-              <a:buChar char="•"/>
-            </a:pPr>
-            <a:r>
-              <a:rPr lang="en-US" sz="3200" dirty="0" smtClean="0">
+            <a:pPr lvl="1"/>
+            <a:r>
+              <a:rPr lang="en-US" sz="2400" dirty="0" smtClean="0">
                 <a:solidFill>
                   <a:schemeClr val="tx1">
                     <a:lumMod val="65000"/>
@@ -6995,10 +7157,13 @@
                 </a:solidFill>
                 <a:cs typeface="Arial" panose="020B0604020202020204" pitchFamily="34" charset="0"/>
               </a:rPr>
-              <a:t>Features of “Virtual </a:t>
-            </a:r>
-            <a:r>
-              <a:rPr lang="en-US" sz="3200" dirty="0" smtClean="0">
+              <a:t>- Ionic Framework, ASP.NET, MySQL,</a:t>
+            </a:r>
+          </a:p>
+          <a:p>
+            <a:pPr lvl="1"/>
+            <a:r>
+              <a:rPr lang="en-US" sz="2400" dirty="0">
                 <a:solidFill>
                   <a:schemeClr val="tx1">
                     <a:lumMod val="65000"/>
@@ -7007,10 +7172,10 @@
                 </a:solidFill>
                 <a:cs typeface="Arial" panose="020B0604020202020204" pitchFamily="34" charset="0"/>
               </a:rPr>
-              <a:t>FLIP </a:t>
-            </a:r>
-            <a:r>
-              <a:rPr lang="en-US" sz="3200" dirty="0" smtClean="0">
+              <a:t> </a:t>
+            </a:r>
+            <a:r>
+              <a:rPr lang="en-US" sz="2400" dirty="0" smtClean="0">
                 <a:solidFill>
                   <a:schemeClr val="tx1">
                     <a:lumMod val="65000"/>
@@ -7019,13 +7184,10 @@
                 </a:solidFill>
                 <a:cs typeface="Arial" panose="020B0604020202020204" pitchFamily="34" charset="0"/>
               </a:rPr>
-              <a:t>Kit”</a:t>
-            </a:r>
-          </a:p>
-          <a:p>
-            <a:pPr lvl="1"/>
-            <a:r>
-              <a:rPr lang="en-US" sz="3200" dirty="0" smtClean="0">
+              <a:t> Node.js, </a:t>
+            </a:r>
+            <a:r>
+              <a:rPr lang="en-US" sz="2400" dirty="0" smtClean="0">
                 <a:solidFill>
                   <a:schemeClr val="tx1">
                     <a:lumMod val="65000"/>
@@ -7034,39 +7196,9 @@
                 </a:solidFill>
                 <a:cs typeface="Arial" panose="020B0604020202020204" pitchFamily="34" charset="0"/>
               </a:rPr>
-              <a:t>- Interactive User Interface</a:t>
-            </a:r>
-          </a:p>
-          <a:p>
-            <a:pPr lvl="1"/>
-            <a:r>
-              <a:rPr lang="en-US" sz="3200" dirty="0" smtClean="0">
-                <a:solidFill>
-                  <a:schemeClr val="tx1">
-                    <a:lumMod val="65000"/>
-                    <a:lumOff val="35000"/>
-                  </a:schemeClr>
-                </a:solidFill>
-                <a:cs typeface="Arial" panose="020B0604020202020204" pitchFamily="34" charset="0"/>
-              </a:rPr>
-              <a:t>- Virtualized Activities</a:t>
-            </a:r>
-          </a:p>
-          <a:p>
-            <a:pPr lvl="1"/>
-            <a:r>
-              <a:rPr lang="en-US" sz="3200" dirty="0" smtClean="0">
-                <a:solidFill>
-                  <a:schemeClr val="tx1">
-                    <a:lumMod val="65000"/>
-                    <a:lumOff val="35000"/>
-                  </a:schemeClr>
-                </a:solidFill>
-                <a:cs typeface="Arial" panose="020B0604020202020204" pitchFamily="34" charset="0"/>
-              </a:rPr>
-              <a:t>- Data Collection</a:t>
-            </a:r>
-            <a:endParaRPr lang="en-US" sz="3200" dirty="0">
+              <a:t>HTML</a:t>
+            </a:r>
+            <a:endParaRPr lang="en-US" sz="2400" dirty="0">
               <a:solidFill>
                 <a:schemeClr val="tx1">
                   <a:lumMod val="65000"/>
@@ -7100,7 +7232,7 @@
         </p:blipFill>
         <p:spPr>
           <a:xfrm>
-            <a:off x="6416566" y="2638842"/>
+            <a:off x="6543566" y="2638842"/>
             <a:ext cx="5674103" cy="4219157"/>
           </a:xfrm>
           <a:prstGeom prst="rect">
@@ -7566,7 +7698,7 @@
         </p:nvSpPr>
         <p:spPr>
           <a:xfrm>
-            <a:off x="618744" y="145669"/>
+            <a:off x="618744" y="272669"/>
             <a:ext cx="10515600" cy="1325563"/>
           </a:xfrm>
           <a:effectLst>
@@ -7610,7 +7742,7 @@
         </p:nvCxnSpPr>
         <p:spPr>
           <a:xfrm flipV="1">
-            <a:off x="0" y="1313280"/>
+            <a:off x="0" y="1440280"/>
             <a:ext cx="12192000" cy="8736"/>
           </a:xfrm>
           <a:prstGeom prst="line">
@@ -7658,8 +7790,8 @@
         </p:nvSpPr>
         <p:spPr>
           <a:xfrm>
-            <a:off x="425116" y="1636295"/>
-            <a:ext cx="10328228" cy="4524315"/>
+            <a:off x="1568116" y="1763295"/>
+            <a:ext cx="10328228" cy="3046988"/>
           </a:xfrm>
           <a:prstGeom prst="rect">
             <a:avLst/>
@@ -7686,7 +7818,46 @@
                 </a:solidFill>
                 <a:cs typeface="Arial" panose="020B0604020202020204" pitchFamily="34" charset="0"/>
               </a:rPr>
-              <a:t>Allows users to interact with digital environment</a:t>
+              <a:t>Allows users to interact with digital </a:t>
+            </a:r>
+            <a:r>
+              <a:rPr lang="en-US" sz="3200" dirty="0" smtClean="0">
+                <a:solidFill>
+                  <a:schemeClr val="tx1">
+                    <a:lumMod val="65000"/>
+                    <a:lumOff val="35000"/>
+                  </a:schemeClr>
+                </a:solidFill>
+                <a:cs typeface="Arial" panose="020B0604020202020204" pitchFamily="34" charset="0"/>
+              </a:rPr>
+              <a:t>environment</a:t>
+            </a:r>
+            <a:endParaRPr lang="en-US" sz="3200" dirty="0" smtClean="0">
+              <a:solidFill>
+                <a:schemeClr val="tx1">
+                  <a:lumMod val="65000"/>
+                  <a:lumOff val="35000"/>
+                </a:schemeClr>
+              </a:solidFill>
+              <a:cs typeface="Arial" panose="020B0604020202020204" pitchFamily="34" charset="0"/>
+            </a:endParaRPr>
+          </a:p>
+          <a:p>
+            <a:pPr marL="285750" indent="-285750">
+              <a:buFont typeface="Arial" panose="020B0604020202020204" pitchFamily="34" charset="0"/>
+              <a:buChar char="•"/>
+            </a:pPr>
+            <a:r>
+              <a:rPr lang="en-US" sz="3200" dirty="0" smtClean="0">
+                <a:solidFill>
+                  <a:schemeClr val="tx1">
+                    <a:lumMod val="65000"/>
+                    <a:lumOff val="35000"/>
+                  </a:schemeClr>
+                </a:solidFill>
+                <a:cs typeface="Arial" panose="020B0604020202020204" pitchFamily="34" charset="0"/>
+              </a:rPr>
+              <a:t>Mixed digital-physical environments</a:t>
             </a:r>
             <a:endParaRPr lang="en-US" sz="3200" dirty="0">
               <a:solidFill>
@@ -7718,7 +7889,7 @@
               <a:buFont typeface="Arial" panose="020B0604020202020204" pitchFamily="34" charset="0"/>
               <a:buChar char="•"/>
             </a:pPr>
-            <a:endParaRPr lang="en-US" sz="3200" dirty="0" smtClean="0">
+            <a:endParaRPr lang="en-US" sz="3200" dirty="0">
               <a:solidFill>
                 <a:schemeClr val="tx1">
                   <a:lumMod val="65000"/>
@@ -7748,6 +7919,44 @@
               <a:buFont typeface="Arial" panose="020B0604020202020204" pitchFamily="34" charset="0"/>
               <a:buChar char="•"/>
             </a:pPr>
+            <a:endParaRPr lang="en-US" sz="3200" dirty="0">
+              <a:solidFill>
+                <a:schemeClr val="tx1">
+                  <a:lumMod val="65000"/>
+                  <a:lumOff val="35000"/>
+                </a:schemeClr>
+              </a:solidFill>
+              <a:cs typeface="Arial" panose="020B0604020202020204" pitchFamily="34" charset="0"/>
+            </a:endParaRPr>
+          </a:p>
+        </p:txBody>
+      </p:sp>
+      <p:sp>
+        <p:nvSpPr>
+          <p:cNvPr id="5" name="TextBox 4"/>
+          <p:cNvSpPr txBox="1"/>
+          <p:nvPr/>
+        </p:nvSpPr>
+        <p:spPr>
+          <a:xfrm>
+            <a:off x="1593516" y="5090695"/>
+            <a:ext cx="10328228" cy="3539430"/>
+          </a:xfrm>
+          <a:prstGeom prst="rect">
+            <a:avLst/>
+          </a:prstGeom>
+          <a:noFill/>
+        </p:spPr>
+        <p:txBody>
+          <a:bodyPr wrap="square" rtlCol="0">
+            <a:spAutoFit/>
+          </a:bodyPr>
+          <a:lstStyle/>
+          <a:p>
+            <a:pPr marL="285750" indent="-285750">
+              <a:buFont typeface="Arial" panose="020B0604020202020204" pitchFamily="34" charset="0"/>
+              <a:buChar char="•"/>
+            </a:pPr>
             <a:r>
               <a:rPr lang="en-US" sz="3200" dirty="0" smtClean="0">
                 <a:solidFill>
@@ -7758,8 +7967,53 @@
                 </a:solidFill>
                 <a:cs typeface="Arial" panose="020B0604020202020204" pitchFamily="34" charset="0"/>
               </a:rPr>
-              <a:t>Mixed digital-physical environments</a:t>
-            </a:r>
+              <a:t>Survey collection after completion of FLIP </a:t>
+            </a:r>
+            <a:r>
+              <a:rPr lang="en-US" sz="3200" dirty="0" smtClean="0">
+                <a:solidFill>
+                  <a:schemeClr val="tx1">
+                    <a:lumMod val="65000"/>
+                    <a:lumOff val="35000"/>
+                  </a:schemeClr>
+                </a:solidFill>
+                <a:cs typeface="Arial" panose="020B0604020202020204" pitchFamily="34" charset="0"/>
+              </a:rPr>
+              <a:t>Kits</a:t>
+            </a:r>
+            <a:endParaRPr lang="en-US" sz="3200" dirty="0">
+              <a:solidFill>
+                <a:schemeClr val="tx1">
+                  <a:lumMod val="65000"/>
+                  <a:lumOff val="35000"/>
+                </a:schemeClr>
+              </a:solidFill>
+              <a:cs typeface="Arial" panose="020B0604020202020204" pitchFamily="34" charset="0"/>
+            </a:endParaRPr>
+          </a:p>
+          <a:p>
+            <a:pPr marL="285750" indent="-285750">
+              <a:buFont typeface="Arial" panose="020B0604020202020204" pitchFamily="34" charset="0"/>
+              <a:buChar char="•"/>
+            </a:pPr>
+            <a:r>
+              <a:rPr lang="en-US" sz="3200" dirty="0" smtClean="0">
+                <a:solidFill>
+                  <a:schemeClr val="tx1">
+                    <a:lumMod val="65000"/>
+                    <a:lumOff val="35000"/>
+                  </a:schemeClr>
+                </a:solidFill>
+                <a:cs typeface="Arial" panose="020B0604020202020204" pitchFamily="34" charset="0"/>
+              </a:rPr>
+              <a:t>Tracks usage of each FLIP Kit in the database</a:t>
+            </a:r>
+          </a:p>
+          <a:p>
+            <a:pPr marL="285750" indent="-285750">
+              <a:buFont typeface="Arial" panose="020B0604020202020204" pitchFamily="34" charset="0"/>
+              <a:buChar char="•"/>
+            </a:pPr>
             <a:endParaRPr lang="en-US" sz="3200" dirty="0">
               <a:solidFill>
                 <a:schemeClr val="tx1">
@@ -7832,6 +8086,121 @@
           </a:p>
         </p:txBody>
       </p:sp>
+      <p:sp>
+        <p:nvSpPr>
+          <p:cNvPr id="6" name="Title 1"/>
+          <p:cNvSpPr txBox="1">
+            <a:spLocks/>
+          </p:cNvSpPr>
+          <p:nvPr/>
+        </p:nvSpPr>
+        <p:spPr>
+          <a:xfrm>
+            <a:off x="644144" y="3600069"/>
+            <a:ext cx="10515600" cy="1325563"/>
+          </a:xfrm>
+          <a:prstGeom prst="rect">
+            <a:avLst/>
+          </a:prstGeom>
+          <a:effectLst>
+            <a:outerShdw blurRad="50800" dist="38100" dir="5400000" algn="t" rotWithShape="0">
+              <a:prstClr val="black">
+                <a:alpha val="41000"/>
+              </a:prstClr>
+            </a:outerShdw>
+          </a:effectLst>
+        </p:spPr>
+        <p:txBody>
+          <a:bodyPr vert="horz" lIns="91440" tIns="45720" rIns="91440" bIns="45720" rtlCol="0" anchor="ctr">
+            <a:noAutofit/>
+          </a:bodyPr>
+          <a:lstStyle>
+            <a:lvl1pPr algn="l" defTabSz="914400" rtl="0" eaLnBrk="1" latinLnBrk="0" hangingPunct="1">
+              <a:lnSpc>
+                <a:spcPct val="90000"/>
+              </a:lnSpc>
+              <a:spcBef>
+                <a:spcPct val="0"/>
+              </a:spcBef>
+              <a:buNone/>
+              <a:defRPr sz="4400" kern="1200">
+                <a:solidFill>
+                  <a:schemeClr val="tx1"/>
+                </a:solidFill>
+                <a:latin typeface="+mj-lt"/>
+                <a:ea typeface="+mj-ea"/>
+                <a:cs typeface="+mj-cs"/>
+              </a:defRPr>
+            </a:lvl1pPr>
+          </a:lstStyle>
+          <a:p>
+            <a:pPr algn="ctr"/>
+            <a:r>
+              <a:rPr lang="en-US" sz="9600" dirty="0" smtClean="0">
+                <a:solidFill>
+                  <a:schemeClr val="bg1"/>
+                </a:solidFill>
+                <a:latin typeface="Bebas Neue" panose="020B0606020202050201" pitchFamily="34" charset="0"/>
+              </a:rPr>
+              <a:t>DATA COLLECTION</a:t>
+            </a:r>
+            <a:endParaRPr lang="en-US" sz="9600" dirty="0">
+              <a:solidFill>
+                <a:schemeClr val="bg1"/>
+              </a:solidFill>
+              <a:latin typeface="Bebas Neue" panose="020B0606020202050201" pitchFamily="34" charset="0"/>
+            </a:endParaRPr>
+          </a:p>
+        </p:txBody>
+      </p:sp>
+      <p:cxnSp>
+        <p:nvCxnSpPr>
+          <p:cNvPr id="7" name="Straight Connector 6"/>
+          <p:cNvCxnSpPr/>
+          <p:nvPr/>
+        </p:nvCxnSpPr>
+        <p:spPr>
+          <a:xfrm flipV="1">
+            <a:off x="25400" y="4767680"/>
+            <a:ext cx="12192000" cy="8736"/>
+          </a:xfrm>
+          <a:prstGeom prst="line">
+            <a:avLst/>
+          </a:prstGeom>
+          <a:ln w="19050">
+            <a:solidFill>
+              <a:schemeClr val="tx1">
+                <a:lumMod val="50000"/>
+                <a:lumOff val="50000"/>
+                <a:alpha val="41000"/>
+              </a:schemeClr>
+            </a:solidFill>
+          </a:ln>
+          <a:effectLst>
+            <a:outerShdw blurRad="50800" dist="38100" dir="8100000" algn="tr" rotWithShape="0">
+              <a:schemeClr val="tx1">
+                <a:lumMod val="50000"/>
+                <a:lumOff val="50000"/>
+                <a:alpha val="47000"/>
+              </a:schemeClr>
+            </a:outerShdw>
+          </a:effectLst>
+        </p:spPr>
+        <p:style>
+          <a:lnRef idx="1">
+            <a:schemeClr val="accent6"/>
+          </a:lnRef>
+          <a:fillRef idx="0">
+            <a:schemeClr val="accent6"/>
+          </a:fillRef>
+          <a:effectRef idx="0">
+            <a:schemeClr val="accent6"/>
+          </a:effectRef>
+          <a:fontRef idx="minor">
+            <a:schemeClr val="tx1"/>
+          </a:fontRef>
+        </p:style>
+      </p:cxnSp>
     </p:spTree>
     <p:extLst>
       <p:ext uri="{BB962C8B-B14F-4D97-AF65-F5344CB8AC3E}">
@@ -7894,477 +8263,6 @@
       </p:grpSpPr>
       <p:sp>
         <p:nvSpPr>
-          <p:cNvPr id="5" name="TextBox 4"/>
-          <p:cNvSpPr txBox="1"/>
-          <p:nvPr/>
-        </p:nvSpPr>
-        <p:spPr>
-          <a:xfrm>
-            <a:off x="425116" y="1636295"/>
-            <a:ext cx="10328228" cy="7478970"/>
-          </a:xfrm>
-          <a:prstGeom prst="rect">
-            <a:avLst/>
-          </a:prstGeom>
-          <a:noFill/>
-        </p:spPr>
-        <p:txBody>
-          <a:bodyPr wrap="square" rtlCol="0">
-            <a:spAutoFit/>
-          </a:bodyPr>
-          <a:lstStyle/>
-          <a:p>
-            <a:pPr marL="285750" indent="-285750">
-              <a:buFont typeface="Arial" panose="020B0604020202020204" pitchFamily="34" charset="0"/>
-              <a:buChar char="•"/>
-            </a:pPr>
-            <a:r>
-              <a:rPr lang="en-US" sz="3200" dirty="0" smtClean="0">
-                <a:solidFill>
-                  <a:schemeClr val="tx1">
-                    <a:lumMod val="65000"/>
-                    <a:lumOff val="35000"/>
-                  </a:schemeClr>
-                </a:solidFill>
-                <a:cs typeface="Arial" panose="020B0604020202020204" pitchFamily="34" charset="0"/>
-              </a:rPr>
-              <a:t>Survey collection after completion of FLIP Kits</a:t>
-            </a:r>
-          </a:p>
-          <a:p>
-            <a:pPr marL="285750" indent="-285750">
-              <a:buFont typeface="Arial" panose="020B0604020202020204" pitchFamily="34" charset="0"/>
-              <a:buChar char="•"/>
-            </a:pPr>
-            <a:endParaRPr lang="en-US" sz="3200" dirty="0">
-              <a:solidFill>
-                <a:schemeClr val="tx1">
-                  <a:lumMod val="65000"/>
-                  <a:lumOff val="35000"/>
-                </a:schemeClr>
-              </a:solidFill>
-              <a:cs typeface="Arial" panose="020B0604020202020204" pitchFamily="34" charset="0"/>
-            </a:endParaRPr>
-          </a:p>
-          <a:p>
-            <a:pPr marL="285750" indent="-285750">
-              <a:buFont typeface="Arial" panose="020B0604020202020204" pitchFamily="34" charset="0"/>
-              <a:buChar char="•"/>
-            </a:pPr>
-            <a:endParaRPr lang="en-US" sz="3200" dirty="0" smtClean="0">
-              <a:solidFill>
-                <a:schemeClr val="tx1">
-                  <a:lumMod val="65000"/>
-                  <a:lumOff val="35000"/>
-                </a:schemeClr>
-              </a:solidFill>
-              <a:cs typeface="Arial" panose="020B0604020202020204" pitchFamily="34" charset="0"/>
-            </a:endParaRPr>
-          </a:p>
-          <a:p>
-            <a:endParaRPr lang="en-US" sz="3200" dirty="0" smtClean="0">
-              <a:solidFill>
-                <a:schemeClr val="tx1">
-                  <a:lumMod val="65000"/>
-                  <a:lumOff val="35000"/>
-                </a:schemeClr>
-              </a:solidFill>
-              <a:cs typeface="Arial" panose="020B0604020202020204" pitchFamily="34" charset="0"/>
-            </a:endParaRPr>
-          </a:p>
-          <a:p>
-            <a:endParaRPr lang="en-US" sz="3200" dirty="0" smtClean="0">
-              <a:solidFill>
-                <a:schemeClr val="tx1">
-                  <a:lumMod val="65000"/>
-                  <a:lumOff val="35000"/>
-                </a:schemeClr>
-              </a:solidFill>
-              <a:cs typeface="Arial" panose="020B0604020202020204" pitchFamily="34" charset="0"/>
-            </a:endParaRPr>
-          </a:p>
-          <a:p>
-            <a:pPr marL="285750" indent="-285750">
-              <a:buFont typeface="Arial" panose="020B0604020202020204" pitchFamily="34" charset="0"/>
-              <a:buChar char="•"/>
-            </a:pPr>
-            <a:endParaRPr lang="en-US" sz="3200" dirty="0" smtClean="0">
-              <a:solidFill>
-                <a:schemeClr val="tx1">
-                  <a:lumMod val="65000"/>
-                  <a:lumOff val="35000"/>
-                </a:schemeClr>
-              </a:solidFill>
-              <a:cs typeface="Arial" panose="020B0604020202020204" pitchFamily="34" charset="0"/>
-            </a:endParaRPr>
-          </a:p>
-          <a:p>
-            <a:pPr marL="285750" indent="-285750">
-              <a:buFont typeface="Arial" panose="020B0604020202020204" pitchFamily="34" charset="0"/>
-              <a:buChar char="•"/>
-            </a:pPr>
-            <a:endParaRPr lang="en-US" sz="3200" dirty="0">
-              <a:solidFill>
-                <a:schemeClr val="tx1">
-                  <a:lumMod val="65000"/>
-                  <a:lumOff val="35000"/>
-                </a:schemeClr>
-              </a:solidFill>
-              <a:cs typeface="Arial" panose="020B0604020202020204" pitchFamily="34" charset="0"/>
-            </a:endParaRPr>
-          </a:p>
-          <a:p>
-            <a:pPr marL="285750" indent="-285750">
-              <a:buFont typeface="Arial" panose="020B0604020202020204" pitchFamily="34" charset="0"/>
-              <a:buChar char="•"/>
-            </a:pPr>
-            <a:endParaRPr lang="en-US" sz="3200" dirty="0" smtClean="0">
-              <a:solidFill>
-                <a:schemeClr val="tx1">
-                  <a:lumMod val="65000"/>
-                  <a:lumOff val="35000"/>
-                </a:schemeClr>
-              </a:solidFill>
-              <a:cs typeface="Arial" panose="020B0604020202020204" pitchFamily="34" charset="0"/>
-            </a:endParaRPr>
-          </a:p>
-          <a:p>
-            <a:pPr marL="285750" indent="-285750">
-              <a:buFont typeface="Arial" panose="020B0604020202020204" pitchFamily="34" charset="0"/>
-              <a:buChar char="•"/>
-            </a:pPr>
-            <a:endParaRPr lang="en-US" sz="3200" dirty="0">
-              <a:solidFill>
-                <a:schemeClr val="tx1">
-                  <a:lumMod val="65000"/>
-                  <a:lumOff val="35000"/>
-                </a:schemeClr>
-              </a:solidFill>
-              <a:cs typeface="Arial" panose="020B0604020202020204" pitchFamily="34" charset="0"/>
-            </a:endParaRPr>
-          </a:p>
-          <a:p>
-            <a:pPr marL="285750" indent="-285750">
-              <a:buFont typeface="Arial" panose="020B0604020202020204" pitchFamily="34" charset="0"/>
-              <a:buChar char="•"/>
-            </a:pPr>
-            <a:r>
-              <a:rPr lang="en-US" sz="3200" dirty="0" smtClean="0">
-                <a:solidFill>
-                  <a:schemeClr val="tx1">
-                    <a:lumMod val="65000"/>
-                    <a:lumOff val="35000"/>
-                  </a:schemeClr>
-                </a:solidFill>
-                <a:cs typeface="Arial" panose="020B0604020202020204" pitchFamily="34" charset="0"/>
-              </a:rPr>
-              <a:t>Tracks usage of each FLIP Kit in the database</a:t>
-            </a:r>
-          </a:p>
-          <a:p>
-            <a:pPr marL="285750" indent="-285750">
-              <a:buFont typeface="Arial" panose="020B0604020202020204" pitchFamily="34" charset="0"/>
-              <a:buChar char="•"/>
-            </a:pPr>
-            <a:endParaRPr lang="en-US" sz="3200" dirty="0">
-              <a:solidFill>
-                <a:schemeClr val="tx1">
-                  <a:lumMod val="65000"/>
-                  <a:lumOff val="35000"/>
-                </a:schemeClr>
-              </a:solidFill>
-              <a:cs typeface="Arial" panose="020B0604020202020204" pitchFamily="34" charset="0"/>
-            </a:endParaRPr>
-          </a:p>
-          <a:p>
-            <a:pPr marL="285750" indent="-285750">
-              <a:buFont typeface="Arial" panose="020B0604020202020204" pitchFamily="34" charset="0"/>
-              <a:buChar char="•"/>
-            </a:pPr>
-            <a:endParaRPr lang="en-US" sz="3200" dirty="0" smtClean="0">
-              <a:solidFill>
-                <a:schemeClr val="tx1">
-                  <a:lumMod val="65000"/>
-                  <a:lumOff val="35000"/>
-                </a:schemeClr>
-              </a:solidFill>
-              <a:cs typeface="Arial" panose="020B0604020202020204" pitchFamily="34" charset="0"/>
-            </a:endParaRPr>
-          </a:p>
-          <a:p>
-            <a:pPr marL="285750" indent="-285750">
-              <a:buFont typeface="Arial" panose="020B0604020202020204" pitchFamily="34" charset="0"/>
-              <a:buChar char="•"/>
-            </a:pPr>
-            <a:endParaRPr lang="en-US" sz="3200" dirty="0">
-              <a:solidFill>
-                <a:schemeClr val="tx1">
-                  <a:lumMod val="65000"/>
-                  <a:lumOff val="35000"/>
-                </a:schemeClr>
-              </a:solidFill>
-              <a:cs typeface="Arial" panose="020B0604020202020204" pitchFamily="34" charset="0"/>
-            </a:endParaRPr>
-          </a:p>
-          <a:p>
-            <a:pPr marL="285750" indent="-285750">
-              <a:buFont typeface="Arial" panose="020B0604020202020204" pitchFamily="34" charset="0"/>
-              <a:buChar char="•"/>
-            </a:pPr>
-            <a:endParaRPr lang="en-US" sz="3200" dirty="0" smtClean="0">
-              <a:solidFill>
-                <a:schemeClr val="tx1">
-                  <a:lumMod val="65000"/>
-                  <a:lumOff val="35000"/>
-                </a:schemeClr>
-              </a:solidFill>
-              <a:cs typeface="Arial" panose="020B0604020202020204" pitchFamily="34" charset="0"/>
-            </a:endParaRPr>
-          </a:p>
-          <a:p>
-            <a:pPr marL="285750" indent="-285750">
-              <a:buFont typeface="Arial" panose="020B0604020202020204" pitchFamily="34" charset="0"/>
-              <a:buChar char="•"/>
-            </a:pPr>
-            <a:endParaRPr lang="en-US" sz="3200" dirty="0">
-              <a:solidFill>
-                <a:schemeClr val="tx1">
-                  <a:lumMod val="65000"/>
-                  <a:lumOff val="35000"/>
-                </a:schemeClr>
-              </a:solidFill>
-              <a:cs typeface="Arial" panose="020B0604020202020204" pitchFamily="34" charset="0"/>
-            </a:endParaRPr>
-          </a:p>
-        </p:txBody>
-      </p:sp>
-      <p:sp>
-        <p:nvSpPr>
-          <p:cNvPr id="6" name="Right Arrow 5"/>
-          <p:cNvSpPr/>
-          <p:nvPr/>
-        </p:nvSpPr>
-        <p:spPr>
-          <a:xfrm>
-            <a:off x="3616036" y="3512127"/>
-            <a:ext cx="2348346" cy="394854"/>
-          </a:xfrm>
-          <a:prstGeom prst="rightArrow">
-            <a:avLst/>
-          </a:prstGeom>
-        </p:spPr>
-        <p:style>
-          <a:lnRef idx="2">
-            <a:schemeClr val="accent1">
-              <a:shade val="50000"/>
-            </a:schemeClr>
-          </a:lnRef>
-          <a:fillRef idx="1">
-            <a:schemeClr val="accent1"/>
-          </a:fillRef>
-          <a:effectRef idx="0">
-            <a:schemeClr val="accent1"/>
-          </a:effectRef>
-          <a:fontRef idx="minor">
-            <a:schemeClr val="lt1"/>
-          </a:fontRef>
-        </p:style>
-        <p:txBody>
-          <a:bodyPr rtlCol="0" anchor="ctr"/>
-          <a:lstStyle/>
-          <a:p>
-            <a:pPr algn="ctr"/>
-            <a:endParaRPr lang="en-US"/>
-          </a:p>
-        </p:txBody>
-      </p:sp>
-      <p:sp>
-        <p:nvSpPr>
-          <p:cNvPr id="2" name="Title 1"/>
-          <p:cNvSpPr>
-            <a:spLocks noGrp="1"/>
-          </p:cNvSpPr>
-          <p:nvPr>
-            <p:ph type="title"/>
-          </p:nvPr>
-        </p:nvSpPr>
-        <p:spPr>
-          <a:xfrm>
-            <a:off x="618744" y="145669"/>
-            <a:ext cx="10515600" cy="1325563"/>
-          </a:xfrm>
-          <a:effectLst>
-            <a:outerShdw blurRad="50800" dist="38100" dir="5400000" algn="t" rotWithShape="0">
-              <a:prstClr val="black">
-                <a:alpha val="41000"/>
-              </a:prstClr>
-            </a:outerShdw>
-          </a:effectLst>
-        </p:spPr>
-        <p:txBody>
-          <a:bodyPr>
-            <a:noAutofit/>
-          </a:bodyPr>
-          <a:lstStyle/>
-          <a:p>
-            <a:pPr algn="ctr"/>
-            <a:r>
-              <a:rPr lang="en-US" sz="9600" dirty="0" smtClean="0">
-                <a:solidFill>
-                  <a:schemeClr val="bg1"/>
-                </a:solidFill>
-                <a:latin typeface="Bebas Neue" panose="020B0606020202050201" pitchFamily="34" charset="0"/>
-              </a:rPr>
-              <a:t>DATA COLLECTION</a:t>
-            </a:r>
-            <a:endParaRPr lang="en-US" sz="9600" dirty="0">
-              <a:solidFill>
-                <a:schemeClr val="bg1"/>
-              </a:solidFill>
-              <a:latin typeface="Bebas Neue" panose="020B0606020202050201" pitchFamily="34" charset="0"/>
-            </a:endParaRPr>
-          </a:p>
-        </p:txBody>
-      </p:sp>
-      <p:cxnSp>
-        <p:nvCxnSpPr>
-          <p:cNvPr id="34" name="Straight Connector 33"/>
-          <p:cNvCxnSpPr/>
-          <p:nvPr/>
-        </p:nvCxnSpPr>
-        <p:spPr>
-          <a:xfrm flipV="1">
-            <a:off x="0" y="1313280"/>
-            <a:ext cx="12192000" cy="8736"/>
-          </a:xfrm>
-          <a:prstGeom prst="line">
-            <a:avLst/>
-          </a:prstGeom>
-          <a:ln w="19050">
-            <a:solidFill>
-              <a:schemeClr val="tx1">
-                <a:lumMod val="50000"/>
-                <a:lumOff val="50000"/>
-                <a:alpha val="41000"/>
-              </a:schemeClr>
-            </a:solidFill>
-          </a:ln>
-          <a:effectLst>
-            <a:outerShdw blurRad="50800" dist="38100" dir="8100000" algn="tr" rotWithShape="0">
-              <a:schemeClr val="tx1">
-                <a:lumMod val="50000"/>
-                <a:lumOff val="50000"/>
-                <a:alpha val="47000"/>
-              </a:schemeClr>
-            </a:outerShdw>
-          </a:effectLst>
-        </p:spPr>
-        <p:style>
-          <a:lnRef idx="1">
-            <a:schemeClr val="accent6"/>
-          </a:lnRef>
-          <a:fillRef idx="0">
-            <a:schemeClr val="accent6"/>
-          </a:fillRef>
-          <a:effectRef idx="0">
-            <a:schemeClr val="accent6"/>
-          </a:effectRef>
-          <a:fontRef idx="minor">
-            <a:schemeClr val="tx1"/>
-          </a:fontRef>
-        </p:style>
-      </p:cxnSp>
-      <p:pic>
-        <p:nvPicPr>
-          <p:cNvPr id="4" name="Picture 3"/>
-          <p:cNvPicPr>
-            <a:picLocks noChangeAspect="1"/>
-          </p:cNvPicPr>
-          <p:nvPr/>
-        </p:nvPicPr>
-        <p:blipFill rotWithShape="1">
-          <a:blip r:embed="rId2">
-            <a:extLst>
-              <a:ext uri="{28A0092B-C50C-407E-A947-70E740481C1C}">
-                <a14:useLocalDpi xmlns:a14="http://schemas.microsoft.com/office/drawing/2010/main" val="0"/>
-              </a:ext>
-            </a:extLst>
-          </a:blip>
-          <a:srcRect l="13820" t="-323" r="8992" b="8496"/>
-          <a:stretch/>
-        </p:blipFill>
-        <p:spPr>
-          <a:xfrm>
-            <a:off x="1163784" y="2286062"/>
-            <a:ext cx="2763982" cy="3551905"/>
-          </a:xfrm>
-          <a:prstGeom prst="rect">
-            <a:avLst/>
-          </a:prstGeom>
-        </p:spPr>
-      </p:pic>
-    </p:spTree>
-    <p:extLst>
-      <p:ext uri="{BB962C8B-B14F-4D97-AF65-F5344CB8AC3E}">
-        <p14:creationId xmlns:p14="http://schemas.microsoft.com/office/powerpoint/2010/main" val="4114056077"/>
-      </p:ext>
-    </p:extLst>
-  </p:cSld>
-  <p:clrMapOvr>
-    <a:masterClrMapping/>
-  </p:clrMapOvr>
-  <mc:AlternateContent xmlns:mc="http://schemas.openxmlformats.org/markup-compatibility/2006" xmlns:p14="http://schemas.microsoft.com/office/powerpoint/2010/main">
-    <mc:Choice Requires="p14">
-      <p:transition spd="slow" p14:dur="1300">
-        <p14:pan dir="u"/>
-      </p:transition>
-    </mc:Choice>
-    <mc:Fallback xmlns="">
-      <p:transition spd="slow">
-        <p:fade/>
-      </p:transition>
-    </mc:Fallback>
-  </mc:AlternateContent>
-  <p:timing>
-    <p:tnLst>
-      <p:par>
-        <p:cTn id="1" dur="indefinite" restart="never" nodeType="tmRoot"/>
-      </p:par>
-    </p:tnLst>
-  </p:timing>
-</p:sld>
-</file>
-
-<file path=ppt/slides/slide6.xml><?xml version="1.0" encoding="utf-8"?>
-<p:sld xmlns:a="http://schemas.openxmlformats.org/drawingml/2006/main" xmlns:r="http://schemas.openxmlformats.org/officeDocument/2006/relationships" xmlns:p="http://schemas.openxmlformats.org/presentationml/2006/main">
-  <p:cSld>
-    <p:bg>
-      <p:bgPr>
-        <a:solidFill>
-          <a:schemeClr val="accent1">
-            <a:lumMod val="60000"/>
-            <a:lumOff val="40000"/>
-          </a:schemeClr>
-        </a:solidFill>
-        <a:effectLst/>
-      </p:bgPr>
-    </p:bg>
-    <p:spTree>
-      <p:nvGrpSpPr>
-        <p:cNvPr id="1" name=""/>
-        <p:cNvGrpSpPr/>
-        <p:nvPr/>
-      </p:nvGrpSpPr>
-      <p:grpSpPr>
-        <a:xfrm>
-          <a:off x="0" y="0"/>
-          <a:ext cx="0" cy="0"/>
-          <a:chOff x="0" y="0"/>
-          <a:chExt cx="0" cy="0"/>
-        </a:xfrm>
-      </p:grpSpPr>
-      <p:sp>
-        <p:nvSpPr>
           <p:cNvPr id="2" name="Title 1"/>
           <p:cNvSpPr>
             <a:spLocks noGrp="1"/>
@@ -8450,337 +8348,6 @@
     </mc:Choice>
     <mc:Fallback xmlns="">
       <p:transition spd="med">
-        <p:fade/>
-      </p:transition>
-    </mc:Fallback>
-  </mc:AlternateContent>
-  <p:timing>
-    <p:tnLst>
-      <p:par>
-        <p:cTn id="1" dur="indefinite" restart="never" nodeType="tmRoot"/>
-      </p:par>
-    </p:tnLst>
-  </p:timing>
-</p:sld>
-</file>
-
-<file path=ppt/slides/slide7.xml><?xml version="1.0" encoding="utf-8"?>
-<p:sld xmlns:a="http://schemas.openxmlformats.org/drawingml/2006/main" xmlns:r="http://schemas.openxmlformats.org/officeDocument/2006/relationships" xmlns:p="http://schemas.openxmlformats.org/presentationml/2006/main">
-  <p:cSld>
-    <p:bg>
-      <p:bgPr>
-        <a:solidFill>
-          <a:schemeClr val="accent1">
-            <a:lumMod val="60000"/>
-            <a:lumOff val="40000"/>
-          </a:schemeClr>
-        </a:solidFill>
-        <a:effectLst/>
-      </p:bgPr>
-    </p:bg>
-    <p:spTree>
-      <p:nvGrpSpPr>
-        <p:cNvPr id="1" name=""/>
-        <p:cNvGrpSpPr/>
-        <p:nvPr/>
-      </p:nvGrpSpPr>
-      <p:grpSpPr>
-        <a:xfrm>
-          <a:off x="0" y="0"/>
-          <a:ext cx="0" cy="0"/>
-          <a:chOff x="0" y="0"/>
-          <a:chExt cx="0" cy="0"/>
-        </a:xfrm>
-      </p:grpSpPr>
-      <p:sp>
-        <p:nvSpPr>
-          <p:cNvPr id="2" name="Title 1"/>
-          <p:cNvSpPr>
-            <a:spLocks noGrp="1"/>
-          </p:cNvSpPr>
-          <p:nvPr>
-            <p:ph type="title"/>
-          </p:nvPr>
-        </p:nvSpPr>
-        <p:spPr>
-          <a:xfrm>
-            <a:off x="618744" y="145669"/>
-            <a:ext cx="10515600" cy="1325563"/>
-          </a:xfrm>
-          <a:effectLst>
-            <a:outerShdw blurRad="50800" dist="38100" dir="5400000" algn="t" rotWithShape="0">
-              <a:prstClr val="black">
-                <a:alpha val="41000"/>
-              </a:prstClr>
-            </a:outerShdw>
-          </a:effectLst>
-        </p:spPr>
-        <p:txBody>
-          <a:bodyPr>
-            <a:noAutofit/>
-          </a:bodyPr>
-          <a:lstStyle/>
-          <a:p>
-            <a:pPr algn="ctr"/>
-            <a:r>
-              <a:rPr lang="en-US" sz="9600" dirty="0" smtClean="0">
-                <a:solidFill>
-                  <a:schemeClr val="bg1"/>
-                </a:solidFill>
-                <a:latin typeface="Bebas Neue" panose="020B0606020202050201" pitchFamily="34" charset="0"/>
-              </a:rPr>
-              <a:t>Roadmap to the future</a:t>
-            </a:r>
-            <a:endParaRPr lang="en-US" sz="9600" dirty="0">
-              <a:solidFill>
-                <a:schemeClr val="bg1"/>
-              </a:solidFill>
-              <a:latin typeface="Bebas Neue" panose="020B0606020202050201" pitchFamily="34" charset="0"/>
-            </a:endParaRPr>
-          </a:p>
-        </p:txBody>
-      </p:sp>
-      <p:cxnSp>
-        <p:nvCxnSpPr>
-          <p:cNvPr id="34" name="Straight Connector 33"/>
-          <p:cNvCxnSpPr/>
-          <p:nvPr/>
-        </p:nvCxnSpPr>
-        <p:spPr>
-          <a:xfrm flipV="1">
-            <a:off x="0" y="1313280"/>
-            <a:ext cx="12192000" cy="8736"/>
-          </a:xfrm>
-          <a:prstGeom prst="line">
-            <a:avLst/>
-          </a:prstGeom>
-          <a:ln w="19050">
-            <a:solidFill>
-              <a:schemeClr val="tx1">
-                <a:lumMod val="50000"/>
-                <a:lumOff val="50000"/>
-                <a:alpha val="41000"/>
-              </a:schemeClr>
-            </a:solidFill>
-          </a:ln>
-          <a:effectLst>
-            <a:outerShdw blurRad="50800" dist="38100" dir="8100000" algn="tr" rotWithShape="0">
-              <a:schemeClr val="tx1">
-                <a:lumMod val="50000"/>
-                <a:lumOff val="50000"/>
-                <a:alpha val="47000"/>
-              </a:schemeClr>
-            </a:outerShdw>
-          </a:effectLst>
-        </p:spPr>
-        <p:style>
-          <a:lnRef idx="1">
-            <a:schemeClr val="accent6"/>
-          </a:lnRef>
-          <a:fillRef idx="0">
-            <a:schemeClr val="accent6"/>
-          </a:fillRef>
-          <a:effectRef idx="0">
-            <a:schemeClr val="accent6"/>
-          </a:effectRef>
-          <a:fontRef idx="minor">
-            <a:schemeClr val="tx1"/>
-          </a:fontRef>
-        </p:style>
-      </p:cxnSp>
-      <p:sp>
-        <p:nvSpPr>
-          <p:cNvPr id="5" name="TextBox 4"/>
-          <p:cNvSpPr txBox="1"/>
-          <p:nvPr/>
-        </p:nvSpPr>
-        <p:spPr>
-          <a:xfrm>
-            <a:off x="425116" y="1636295"/>
-            <a:ext cx="10328228" cy="5016758"/>
-          </a:xfrm>
-          <a:prstGeom prst="rect">
-            <a:avLst/>
-          </a:prstGeom>
-          <a:noFill/>
-        </p:spPr>
-        <p:txBody>
-          <a:bodyPr wrap="square" rtlCol="0">
-            <a:spAutoFit/>
-          </a:bodyPr>
-          <a:lstStyle/>
-          <a:p>
-            <a:pPr marL="285750" indent="-285750">
-              <a:buFont typeface="Arial" panose="020B0604020202020204" pitchFamily="34" charset="0"/>
-              <a:buChar char="•"/>
-            </a:pPr>
-            <a:r>
-              <a:rPr lang="en-US" sz="3200" dirty="0" smtClean="0">
-                <a:solidFill>
-                  <a:schemeClr val="tx1">
-                    <a:lumMod val="65000"/>
-                    <a:lumOff val="35000"/>
-                  </a:schemeClr>
-                </a:solidFill>
-                <a:cs typeface="Arial" panose="020B0604020202020204" pitchFamily="34" charset="0"/>
-              </a:rPr>
-              <a:t>FLIP Kits Recommendations algorithm</a:t>
-            </a:r>
-          </a:p>
-          <a:p>
-            <a:pPr marL="285750" indent="-285750">
-              <a:buFont typeface="Arial" panose="020B0604020202020204" pitchFamily="34" charset="0"/>
-              <a:buChar char="•"/>
-            </a:pPr>
-            <a:endParaRPr lang="en-US" sz="3200" dirty="0">
-              <a:solidFill>
-                <a:schemeClr val="tx1">
-                  <a:lumMod val="65000"/>
-                  <a:lumOff val="35000"/>
-                </a:schemeClr>
-              </a:solidFill>
-              <a:cs typeface="Arial" panose="020B0604020202020204" pitchFamily="34" charset="0"/>
-            </a:endParaRPr>
-          </a:p>
-          <a:p>
-            <a:pPr marL="285750" indent="-285750">
-              <a:buFont typeface="Arial" panose="020B0604020202020204" pitchFamily="34" charset="0"/>
-              <a:buChar char="•"/>
-            </a:pPr>
-            <a:endParaRPr lang="en-US" sz="3200" dirty="0" smtClean="0">
-              <a:solidFill>
-                <a:schemeClr val="tx1">
-                  <a:lumMod val="65000"/>
-                  <a:lumOff val="35000"/>
-                </a:schemeClr>
-              </a:solidFill>
-              <a:cs typeface="Arial" panose="020B0604020202020204" pitchFamily="34" charset="0"/>
-            </a:endParaRPr>
-          </a:p>
-          <a:p>
-            <a:endParaRPr lang="en-US" sz="3200" dirty="0" smtClean="0">
-              <a:solidFill>
-                <a:schemeClr val="tx1">
-                  <a:lumMod val="65000"/>
-                  <a:lumOff val="35000"/>
-                </a:schemeClr>
-              </a:solidFill>
-              <a:cs typeface="Arial" panose="020B0604020202020204" pitchFamily="34" charset="0"/>
-            </a:endParaRPr>
-          </a:p>
-          <a:p>
-            <a:pPr marL="285750" indent="-285750">
-              <a:buFont typeface="Arial" panose="020B0604020202020204" pitchFamily="34" charset="0"/>
-              <a:buChar char="•"/>
-            </a:pPr>
-            <a:r>
-              <a:rPr lang="en-US" sz="3200" dirty="0" smtClean="0">
-                <a:solidFill>
-                  <a:schemeClr val="tx1">
-                    <a:lumMod val="65000"/>
-                    <a:lumOff val="35000"/>
-                  </a:schemeClr>
-                </a:solidFill>
-                <a:cs typeface="Arial" panose="020B0604020202020204" pitchFamily="34" charset="0"/>
-              </a:rPr>
-              <a:t>Social media sharing</a:t>
-            </a:r>
-          </a:p>
-          <a:p>
-            <a:pPr marL="285750" indent="-285750">
-              <a:buFont typeface="Arial" panose="020B0604020202020204" pitchFamily="34" charset="0"/>
-              <a:buChar char="•"/>
-            </a:pPr>
-            <a:endParaRPr lang="en-US" sz="3200" dirty="0">
-              <a:solidFill>
-                <a:schemeClr val="tx1">
-                  <a:lumMod val="65000"/>
-                  <a:lumOff val="35000"/>
-                </a:schemeClr>
-              </a:solidFill>
-              <a:cs typeface="Arial" panose="020B0604020202020204" pitchFamily="34" charset="0"/>
-            </a:endParaRPr>
-          </a:p>
-          <a:p>
-            <a:pPr marL="285750" indent="-285750">
-              <a:buFont typeface="Arial" panose="020B0604020202020204" pitchFamily="34" charset="0"/>
-              <a:buChar char="•"/>
-            </a:pPr>
-            <a:endParaRPr lang="en-US" sz="3200" dirty="0" smtClean="0">
-              <a:solidFill>
-                <a:schemeClr val="tx1">
-                  <a:lumMod val="65000"/>
-                  <a:lumOff val="35000"/>
-                </a:schemeClr>
-              </a:solidFill>
-              <a:cs typeface="Arial" panose="020B0604020202020204" pitchFamily="34" charset="0"/>
-            </a:endParaRPr>
-          </a:p>
-          <a:p>
-            <a:pPr marL="285750" indent="-285750">
-              <a:buFont typeface="Arial" panose="020B0604020202020204" pitchFamily="34" charset="0"/>
-              <a:buChar char="•"/>
-            </a:pPr>
-            <a:endParaRPr lang="en-US" sz="3200" dirty="0">
-              <a:solidFill>
-                <a:schemeClr val="tx1">
-                  <a:lumMod val="65000"/>
-                  <a:lumOff val="35000"/>
-                </a:schemeClr>
-              </a:solidFill>
-              <a:cs typeface="Arial" panose="020B0604020202020204" pitchFamily="34" charset="0"/>
-            </a:endParaRPr>
-          </a:p>
-          <a:p>
-            <a:pPr marL="285750" indent="-285750">
-              <a:buFont typeface="Arial" panose="020B0604020202020204" pitchFamily="34" charset="0"/>
-              <a:buChar char="•"/>
-            </a:pPr>
-            <a:endParaRPr lang="en-US" sz="3200" dirty="0" smtClean="0">
-              <a:solidFill>
-                <a:schemeClr val="tx1">
-                  <a:lumMod val="65000"/>
-                  <a:lumOff val="35000"/>
-                </a:schemeClr>
-              </a:solidFill>
-              <a:cs typeface="Arial" panose="020B0604020202020204" pitchFamily="34" charset="0"/>
-            </a:endParaRPr>
-          </a:p>
-          <a:p>
-            <a:pPr marL="285750" indent="-285750">
-              <a:buFont typeface="Arial" panose="020B0604020202020204" pitchFamily="34" charset="0"/>
-              <a:buChar char="•"/>
-            </a:pPr>
-            <a:endParaRPr lang="en-US" sz="3200" dirty="0">
-              <a:solidFill>
-                <a:schemeClr val="tx1">
-                  <a:lumMod val="65000"/>
-                  <a:lumOff val="35000"/>
-                </a:schemeClr>
-              </a:solidFill>
-              <a:cs typeface="Arial" panose="020B0604020202020204" pitchFamily="34" charset="0"/>
-            </a:endParaRPr>
-          </a:p>
-        </p:txBody>
-      </p:sp>
-    </p:spTree>
-    <p:extLst>
-      <p:ext uri="{BB962C8B-B14F-4D97-AF65-F5344CB8AC3E}">
-        <p14:creationId xmlns:p14="http://schemas.microsoft.com/office/powerpoint/2010/main" val="2034172408"/>
-      </p:ext>
-    </p:extLst>
-  </p:cSld>
-  <p:clrMapOvr>
-    <a:masterClrMapping/>
-  </p:clrMapOvr>
-  <mc:AlternateContent xmlns:mc="http://schemas.openxmlformats.org/markup-compatibility/2006" xmlns:p14="http://schemas.microsoft.com/office/powerpoint/2010/main">
-    <mc:Choice Requires="p14">
-      <p:transition spd="slow" p14:dur="1300">
-        <p14:pan dir="u"/>
-      </p:transition>
-    </mc:Choice>
-    <mc:Fallback xmlns="">
-      <p:transition spd="slow">
         <p:fade/>
       </p:transition>
     </mc:Fallback>

</xml_diff>